<commit_message>
A few tweaks to the presentation...
</commit_message>
<xml_diff>
--- a/MSDSPresentationDRAFT.pptx
+++ b/MSDSPresentationDRAFT.pptx
@@ -137,68 +137,86 @@
 </file>
 
 <file path=ppt/diagrams/colors1.xml><?xml version="1.0" encoding="utf-8"?>
-<dgm:colorsDef xmlns:dgm="http://schemas.openxmlformats.org/drawingml/2006/diagram" xmlns:a="http://schemas.openxmlformats.org/drawingml/2006/main" uniqueId="urn:microsoft.com/office/officeart/2005/8/colors/accent2_2">
+<dgm:colorsDef xmlns:dgm="http://schemas.openxmlformats.org/drawingml/2006/diagram" xmlns:a="http://schemas.openxmlformats.org/drawingml/2006/main" uniqueId="urn:microsoft.com/office/officeart/2005/8/colors/accent0_1">
   <dgm:title val=""/>
   <dgm:desc val=""/>
   <dgm:catLst>
-    <dgm:cat type="accent2" pri="11200"/>
+    <dgm:cat type="mainScheme" pri="10100"/>
   </dgm:catLst>
   <dgm:styleLbl name="node0">
     <dgm:fillClrLst meth="repeat">
-      <a:schemeClr val="accent2"/>
+      <a:schemeClr val="lt1"/>
     </dgm:fillClrLst>
     <dgm:linClrLst meth="repeat">
-      <a:schemeClr val="lt1"/>
+      <a:schemeClr val="dk1">
+        <a:shade val="80000"/>
+      </a:schemeClr>
     </dgm:linClrLst>
     <dgm:effectClrLst/>
     <dgm:txLinClrLst/>
-    <dgm:txFillClrLst/>
+    <dgm:txFillClrLst meth="repeat">
+      <a:schemeClr val="dk1"/>
+    </dgm:txFillClrLst>
     <dgm:txEffectClrLst/>
   </dgm:styleLbl>
   <dgm:styleLbl name="node1">
     <dgm:fillClrLst meth="repeat">
-      <a:schemeClr val="accent2"/>
+      <a:schemeClr val="lt1"/>
     </dgm:fillClrLst>
     <dgm:linClrLst meth="repeat">
-      <a:schemeClr val="lt1"/>
+      <a:schemeClr val="dk1">
+        <a:shade val="80000"/>
+      </a:schemeClr>
     </dgm:linClrLst>
     <dgm:effectClrLst/>
     <dgm:txLinClrLst/>
-    <dgm:txFillClrLst/>
+    <dgm:txFillClrLst meth="repeat">
+      <a:schemeClr val="dk1"/>
+    </dgm:txFillClrLst>
     <dgm:txEffectClrLst/>
   </dgm:styleLbl>
   <dgm:styleLbl name="alignNode1">
     <dgm:fillClrLst meth="repeat">
-      <a:schemeClr val="accent2"/>
+      <a:schemeClr val="lt1"/>
     </dgm:fillClrLst>
     <dgm:linClrLst meth="repeat">
-      <a:schemeClr val="accent2"/>
+      <a:schemeClr val="dk1">
+        <a:shade val="80000"/>
+      </a:schemeClr>
     </dgm:linClrLst>
     <dgm:effectClrLst/>
     <dgm:txLinClrLst/>
-    <dgm:txFillClrLst/>
+    <dgm:txFillClrLst meth="repeat">
+      <a:schemeClr val="dk1"/>
+    </dgm:txFillClrLst>
     <dgm:txEffectClrLst/>
   </dgm:styleLbl>
   <dgm:styleLbl name="lnNode1">
     <dgm:fillClrLst meth="repeat">
-      <a:schemeClr val="accent2"/>
+      <a:schemeClr val="lt1"/>
     </dgm:fillClrLst>
     <dgm:linClrLst meth="repeat">
-      <a:schemeClr val="lt1"/>
+      <a:schemeClr val="dk1">
+        <a:shade val="80000"/>
+      </a:schemeClr>
     </dgm:linClrLst>
     <dgm:effectClrLst/>
     <dgm:txLinClrLst/>
-    <dgm:txFillClrLst/>
+    <dgm:txFillClrLst meth="repeat">
+      <a:schemeClr val="dk1"/>
+    </dgm:txFillClrLst>
     <dgm:txEffectClrLst/>
   </dgm:styleLbl>
   <dgm:styleLbl name="vennNode1">
     <dgm:fillClrLst meth="repeat">
-      <a:schemeClr val="accent2">
+      <a:schemeClr val="lt1">
         <a:alpha val="50000"/>
       </a:schemeClr>
     </dgm:fillClrLst>
     <dgm:linClrLst meth="repeat">
-      <a:schemeClr val="lt1"/>
+      <a:schemeClr val="dk1">
+        <a:shade val="80000"/>
+      </a:schemeClr>
     </dgm:linClrLst>
     <dgm:effectClrLst/>
     <dgm:txLinClrLst/>
@@ -207,48 +225,62 @@
   </dgm:styleLbl>
   <dgm:styleLbl name="node2">
     <dgm:fillClrLst meth="repeat">
-      <a:schemeClr val="accent2"/>
+      <a:schemeClr val="lt1"/>
     </dgm:fillClrLst>
     <dgm:linClrLst meth="repeat">
-      <a:schemeClr val="lt1"/>
+      <a:schemeClr val="dk1">
+        <a:shade val="80000"/>
+      </a:schemeClr>
     </dgm:linClrLst>
     <dgm:effectClrLst/>
     <dgm:txLinClrLst/>
-    <dgm:txFillClrLst/>
+    <dgm:txFillClrLst meth="repeat">
+      <a:schemeClr val="dk1"/>
+    </dgm:txFillClrLst>
     <dgm:txEffectClrLst/>
   </dgm:styleLbl>
   <dgm:styleLbl name="node3">
     <dgm:fillClrLst meth="repeat">
-      <a:schemeClr val="accent2"/>
+      <a:schemeClr val="lt1"/>
     </dgm:fillClrLst>
     <dgm:linClrLst meth="repeat">
-      <a:schemeClr val="lt1"/>
+      <a:schemeClr val="dk1">
+        <a:shade val="80000"/>
+      </a:schemeClr>
     </dgm:linClrLst>
     <dgm:effectClrLst/>
     <dgm:txLinClrLst/>
-    <dgm:txFillClrLst/>
+    <dgm:txFillClrLst meth="repeat">
+      <a:schemeClr val="dk1"/>
+    </dgm:txFillClrLst>
     <dgm:txEffectClrLst/>
   </dgm:styleLbl>
   <dgm:styleLbl name="node4">
     <dgm:fillClrLst meth="repeat">
-      <a:schemeClr val="accent2"/>
+      <a:schemeClr val="lt1"/>
     </dgm:fillClrLst>
     <dgm:linClrLst meth="repeat">
-      <a:schemeClr val="lt1"/>
+      <a:schemeClr val="dk1">
+        <a:shade val="80000"/>
+      </a:schemeClr>
     </dgm:linClrLst>
     <dgm:effectClrLst/>
     <dgm:txLinClrLst/>
-    <dgm:txFillClrLst/>
+    <dgm:txFillClrLst meth="repeat">
+      <a:schemeClr val="dk1"/>
+    </dgm:txFillClrLst>
     <dgm:txEffectClrLst/>
   </dgm:styleLbl>
   <dgm:styleLbl name="fgImgPlace1">
     <dgm:fillClrLst meth="repeat">
-      <a:schemeClr val="accent2">
-        <a:tint val="50000"/>
+      <a:schemeClr val="dk1">
+        <a:tint val="40000"/>
       </a:schemeClr>
     </dgm:fillClrLst>
     <dgm:linClrLst meth="repeat">
-      <a:schemeClr val="lt1"/>
+      <a:schemeClr val="dk1">
+        <a:shade val="80000"/>
+      </a:schemeClr>
     </dgm:linClrLst>
     <dgm:effectClrLst/>
     <dgm:txLinClrLst/>
@@ -259,12 +291,14 @@
   </dgm:styleLbl>
   <dgm:styleLbl name="alignImgPlace1">
     <dgm:fillClrLst meth="repeat">
-      <a:schemeClr val="accent2">
-        <a:tint val="50000"/>
+      <a:schemeClr val="dk1">
+        <a:tint val="40000"/>
       </a:schemeClr>
     </dgm:fillClrLst>
     <dgm:linClrLst meth="repeat">
-      <a:schemeClr val="lt1"/>
+      <a:schemeClr val="dk1">
+        <a:shade val="80000"/>
+      </a:schemeClr>
     </dgm:linClrLst>
     <dgm:effectClrLst/>
     <dgm:txLinClrLst/>
@@ -275,12 +309,14 @@
   </dgm:styleLbl>
   <dgm:styleLbl name="bgImgPlace1">
     <dgm:fillClrLst meth="repeat">
-      <a:schemeClr val="accent2">
-        <a:tint val="50000"/>
+      <a:schemeClr val="dk1">
+        <a:tint val="40000"/>
       </a:schemeClr>
     </dgm:fillClrLst>
     <dgm:linClrLst meth="repeat">
-      <a:schemeClr val="lt1"/>
+      <a:schemeClr val="dk1">
+        <a:shade val="80000"/>
+      </a:schemeClr>
     </dgm:linClrLst>
     <dgm:effectClrLst/>
     <dgm:txLinClrLst/>
@@ -291,58 +327,64 @@
   </dgm:styleLbl>
   <dgm:styleLbl name="sibTrans2D1">
     <dgm:fillClrLst meth="repeat">
-      <a:schemeClr val="accent2">
+      <a:schemeClr val="dk1">
         <a:tint val="60000"/>
       </a:schemeClr>
     </dgm:fillClrLst>
     <dgm:linClrLst meth="repeat">
-      <a:schemeClr val="accent2">
+      <a:schemeClr val="dk1">
         <a:tint val="60000"/>
       </a:schemeClr>
     </dgm:linClrLst>
     <dgm:effectClrLst/>
     <dgm:txLinClrLst/>
-    <dgm:txFillClrLst/>
+    <dgm:txFillClrLst meth="repeat">
+      <a:schemeClr val="dk1"/>
+    </dgm:txFillClrLst>
     <dgm:txEffectClrLst/>
   </dgm:styleLbl>
   <dgm:styleLbl name="fgSibTrans2D1">
     <dgm:fillClrLst meth="repeat">
-      <a:schemeClr val="accent2">
+      <a:schemeClr val="dk1">
         <a:tint val="60000"/>
       </a:schemeClr>
     </dgm:fillClrLst>
     <dgm:linClrLst meth="repeat">
-      <a:schemeClr val="accent2">
+      <a:schemeClr val="dk1">
         <a:tint val="60000"/>
       </a:schemeClr>
     </dgm:linClrLst>
     <dgm:effectClrLst/>
     <dgm:txLinClrLst/>
-    <dgm:txFillClrLst/>
+    <dgm:txFillClrLst meth="repeat">
+      <a:schemeClr val="dk1"/>
+    </dgm:txFillClrLst>
     <dgm:txEffectClrLst/>
   </dgm:styleLbl>
   <dgm:styleLbl name="bgSibTrans2D1">
     <dgm:fillClrLst meth="repeat">
-      <a:schemeClr val="accent2">
+      <a:schemeClr val="dk1">
         <a:tint val="60000"/>
       </a:schemeClr>
     </dgm:fillClrLst>
     <dgm:linClrLst meth="repeat">
-      <a:schemeClr val="accent2">
+      <a:schemeClr val="dk1">
         <a:tint val="60000"/>
       </a:schemeClr>
     </dgm:linClrLst>
     <dgm:effectClrLst/>
     <dgm:txLinClrLst/>
-    <dgm:txFillClrLst/>
+    <dgm:txFillClrLst meth="repeat">
+      <a:schemeClr val="dk1"/>
+    </dgm:txFillClrLst>
     <dgm:txEffectClrLst/>
   </dgm:styleLbl>
   <dgm:styleLbl name="sibTrans1D1">
     <dgm:fillClrLst meth="repeat">
-      <a:schemeClr val="accent2"/>
+      <a:schemeClr val="dk1"/>
     </dgm:fillClrLst>
     <dgm:linClrLst meth="repeat">
-      <a:schemeClr val="accent2"/>
+      <a:schemeClr val="dk1"/>
     </dgm:linClrLst>
     <dgm:effectClrLst/>
     <dgm:txLinClrLst/>
@@ -353,12 +395,10 @@
   </dgm:styleLbl>
   <dgm:styleLbl name="callout">
     <dgm:fillClrLst meth="repeat">
-      <a:schemeClr val="accent2"/>
+      <a:schemeClr val="dk1"/>
     </dgm:fillClrLst>
     <dgm:linClrLst meth="repeat">
-      <a:schemeClr val="accent2">
-        <a:tint val="50000"/>
-      </a:schemeClr>
+      <a:schemeClr val="dk1"/>
     </dgm:linClrLst>
     <dgm:effectClrLst/>
     <dgm:txLinClrLst/>
@@ -369,116 +409,130 @@
   </dgm:styleLbl>
   <dgm:styleLbl name="asst0">
     <dgm:fillClrLst meth="repeat">
-      <a:schemeClr val="accent2"/>
+      <a:schemeClr val="lt1"/>
     </dgm:fillClrLst>
     <dgm:linClrLst meth="repeat">
+      <a:schemeClr val="dk1">
+        <a:shade val="80000"/>
+      </a:schemeClr>
+    </dgm:linClrLst>
+    <dgm:effectClrLst/>
+    <dgm:txLinClrLst/>
+    <dgm:txFillClrLst meth="repeat">
+      <a:schemeClr val="dk1"/>
+    </dgm:txFillClrLst>
+    <dgm:txEffectClrLst/>
+  </dgm:styleLbl>
+  <dgm:styleLbl name="asst1">
+    <dgm:fillClrLst meth="repeat">
       <a:schemeClr val="lt1"/>
+    </dgm:fillClrLst>
+    <dgm:linClrLst meth="repeat">
+      <a:schemeClr val="dk1">
+        <a:shade val="80000"/>
+      </a:schemeClr>
+    </dgm:linClrLst>
+    <dgm:effectClrLst/>
+    <dgm:txLinClrLst/>
+    <dgm:txFillClrLst meth="repeat">
+      <a:schemeClr val="dk1"/>
+    </dgm:txFillClrLst>
+    <dgm:txEffectClrLst/>
+  </dgm:styleLbl>
+  <dgm:styleLbl name="asst2">
+    <dgm:fillClrLst meth="repeat">
+      <a:schemeClr val="lt1"/>
+    </dgm:fillClrLst>
+    <dgm:linClrLst meth="repeat">
+      <a:schemeClr val="dk1">
+        <a:shade val="80000"/>
+      </a:schemeClr>
+    </dgm:linClrLst>
+    <dgm:effectClrLst/>
+    <dgm:txLinClrLst/>
+    <dgm:txFillClrLst meth="repeat">
+      <a:schemeClr val="dk1"/>
+    </dgm:txFillClrLst>
+    <dgm:txEffectClrLst/>
+  </dgm:styleLbl>
+  <dgm:styleLbl name="asst3">
+    <dgm:fillClrLst meth="repeat">
+      <a:schemeClr val="lt1"/>
+    </dgm:fillClrLst>
+    <dgm:linClrLst meth="repeat">
+      <a:schemeClr val="dk1">
+        <a:shade val="80000"/>
+      </a:schemeClr>
+    </dgm:linClrLst>
+    <dgm:effectClrLst/>
+    <dgm:txLinClrLst/>
+    <dgm:txFillClrLst meth="repeat">
+      <a:schemeClr val="dk1"/>
+    </dgm:txFillClrLst>
+    <dgm:txEffectClrLst/>
+  </dgm:styleLbl>
+  <dgm:styleLbl name="asst4">
+    <dgm:fillClrLst meth="repeat">
+      <a:schemeClr val="lt1"/>
+    </dgm:fillClrLst>
+    <dgm:linClrLst meth="repeat">
+      <a:schemeClr val="dk1">
+        <a:shade val="80000"/>
+      </a:schemeClr>
+    </dgm:linClrLst>
+    <dgm:effectClrLst/>
+    <dgm:txLinClrLst/>
+    <dgm:txFillClrLst meth="repeat">
+      <a:schemeClr val="dk1"/>
+    </dgm:txFillClrLst>
+    <dgm:txEffectClrLst/>
+  </dgm:styleLbl>
+  <dgm:styleLbl name="parChTrans2D1">
+    <dgm:fillClrLst meth="repeat">
+      <a:schemeClr val="dk1">
+        <a:tint val="60000"/>
+      </a:schemeClr>
+    </dgm:fillClrLst>
+    <dgm:linClrLst meth="repeat">
+      <a:schemeClr val="dk1">
+        <a:tint val="60000"/>
+      </a:schemeClr>
     </dgm:linClrLst>
     <dgm:effectClrLst/>
     <dgm:txLinClrLst/>
     <dgm:txFillClrLst/>
     <dgm:txEffectClrLst/>
   </dgm:styleLbl>
-  <dgm:styleLbl name="asst1">
+  <dgm:styleLbl name="parChTrans2D2">
     <dgm:fillClrLst meth="repeat">
-      <a:schemeClr val="accent2"/>
+      <a:schemeClr val="dk1"/>
     </dgm:fillClrLst>
     <dgm:linClrLst meth="repeat">
-      <a:schemeClr val="lt1"/>
+      <a:schemeClr val="dk1"/>
     </dgm:linClrLst>
     <dgm:effectClrLst/>
     <dgm:txLinClrLst/>
     <dgm:txFillClrLst/>
     <dgm:txEffectClrLst/>
   </dgm:styleLbl>
-  <dgm:styleLbl name="asst2">
+  <dgm:styleLbl name="parChTrans2D3">
     <dgm:fillClrLst meth="repeat">
-      <a:schemeClr val="accent2"/>
+      <a:schemeClr val="dk1"/>
     </dgm:fillClrLst>
     <dgm:linClrLst meth="repeat">
-      <a:schemeClr val="lt1"/>
+      <a:schemeClr val="dk1"/>
     </dgm:linClrLst>
     <dgm:effectClrLst/>
     <dgm:txLinClrLst/>
     <dgm:txFillClrLst/>
     <dgm:txEffectClrLst/>
   </dgm:styleLbl>
-  <dgm:styleLbl name="asst3">
+  <dgm:styleLbl name="parChTrans2D4">
     <dgm:fillClrLst meth="repeat">
-      <a:schemeClr val="accent2"/>
+      <a:schemeClr val="dk1"/>
     </dgm:fillClrLst>
     <dgm:linClrLst meth="repeat">
-      <a:schemeClr val="lt1"/>
-    </dgm:linClrLst>
-    <dgm:effectClrLst/>
-    <dgm:txLinClrLst/>
-    <dgm:txFillClrLst/>
-    <dgm:txEffectClrLst/>
-  </dgm:styleLbl>
-  <dgm:styleLbl name="asst4">
-    <dgm:fillClrLst meth="repeat">
-      <a:schemeClr val="accent2"/>
-    </dgm:fillClrLst>
-    <dgm:linClrLst meth="repeat">
-      <a:schemeClr val="lt1"/>
-    </dgm:linClrLst>
-    <dgm:effectClrLst/>
-    <dgm:txLinClrLst/>
-    <dgm:txFillClrLst/>
-    <dgm:txEffectClrLst/>
-  </dgm:styleLbl>
-  <dgm:styleLbl name="parChTrans2D1">
-    <dgm:fillClrLst meth="repeat">
-      <a:schemeClr val="accent2">
-        <a:tint val="60000"/>
-      </a:schemeClr>
-    </dgm:fillClrLst>
-    <dgm:linClrLst meth="repeat">
-      <a:schemeClr val="accent2">
-        <a:tint val="60000"/>
-      </a:schemeClr>
-    </dgm:linClrLst>
-    <dgm:effectClrLst/>
-    <dgm:txLinClrLst/>
-    <dgm:txFillClrLst meth="repeat">
-      <a:schemeClr val="lt1"/>
-    </dgm:txFillClrLst>
-    <dgm:txEffectClrLst/>
-  </dgm:styleLbl>
-  <dgm:styleLbl name="parChTrans2D2">
-    <dgm:fillClrLst meth="repeat">
-      <a:schemeClr val="accent2"/>
-    </dgm:fillClrLst>
-    <dgm:linClrLst meth="repeat">
-      <a:schemeClr val="accent2"/>
-    </dgm:linClrLst>
-    <dgm:effectClrLst/>
-    <dgm:txLinClrLst/>
-    <dgm:txFillClrLst meth="repeat">
-      <a:schemeClr val="lt1"/>
-    </dgm:txFillClrLst>
-    <dgm:txEffectClrLst/>
-  </dgm:styleLbl>
-  <dgm:styleLbl name="parChTrans2D3">
-    <dgm:fillClrLst meth="repeat">
-      <a:schemeClr val="accent2"/>
-    </dgm:fillClrLst>
-    <dgm:linClrLst meth="repeat">
-      <a:schemeClr val="accent2"/>
-    </dgm:linClrLst>
-    <dgm:effectClrLst/>
-    <dgm:txLinClrLst/>
-    <dgm:txFillClrLst meth="repeat">
-      <a:schemeClr val="lt1"/>
-    </dgm:txFillClrLst>
-    <dgm:txEffectClrLst/>
-  </dgm:styleLbl>
-  <dgm:styleLbl name="parChTrans2D4">
-    <dgm:fillClrLst meth="repeat">
-      <a:schemeClr val="accent2"/>
-    </dgm:fillClrLst>
-    <dgm:linClrLst meth="repeat">
-      <a:schemeClr val="accent2"/>
+      <a:schemeClr val="dk1"/>
     </dgm:linClrLst>
     <dgm:effectClrLst/>
     <dgm:txLinClrLst/>
@@ -489,10 +543,10 @@
   </dgm:styleLbl>
   <dgm:styleLbl name="parChTrans1D1">
     <dgm:fillClrLst meth="repeat">
-      <a:schemeClr val="accent2"/>
+      <a:schemeClr val="dk1"/>
     </dgm:fillClrLst>
     <dgm:linClrLst meth="repeat">
-      <a:schemeClr val="accent2">
+      <a:schemeClr val="dk1">
         <a:shade val="60000"/>
       </a:schemeClr>
     </dgm:linClrLst>
@@ -505,10 +559,10 @@
   </dgm:styleLbl>
   <dgm:styleLbl name="parChTrans1D2">
     <dgm:fillClrLst meth="repeat">
-      <a:schemeClr val="accent2"/>
+      <a:schemeClr val="dk1"/>
     </dgm:fillClrLst>
     <dgm:linClrLst meth="repeat">
-      <a:schemeClr val="accent2">
+      <a:schemeClr val="dk1">
         <a:shade val="60000"/>
       </a:schemeClr>
     </dgm:linClrLst>
@@ -521,10 +575,10 @@
   </dgm:styleLbl>
   <dgm:styleLbl name="parChTrans1D3">
     <dgm:fillClrLst meth="repeat">
-      <a:schemeClr val="accent2"/>
+      <a:schemeClr val="dk1"/>
     </dgm:fillClrLst>
     <dgm:linClrLst meth="repeat">
-      <a:schemeClr val="accent2">
+      <a:schemeClr val="dk1">
         <a:shade val="80000"/>
       </a:schemeClr>
     </dgm:linClrLst>
@@ -537,10 +591,10 @@
   </dgm:styleLbl>
   <dgm:styleLbl name="parChTrans1D4">
     <dgm:fillClrLst meth="repeat">
-      <a:schemeClr val="accent2"/>
+      <a:schemeClr val="dk1"/>
     </dgm:fillClrLst>
     <dgm:linClrLst meth="repeat">
-      <a:schemeClr val="accent2">
+      <a:schemeClr val="dk1">
         <a:shade val="80000"/>
       </a:schemeClr>
     </dgm:linClrLst>
@@ -553,12 +607,13 @@
   </dgm:styleLbl>
   <dgm:styleLbl name="fgAcc1">
     <dgm:fillClrLst meth="repeat">
-      <a:schemeClr val="lt1">
+      <a:schemeClr val="dk1">
         <a:alpha val="90000"/>
+        <a:tint val="40000"/>
       </a:schemeClr>
     </dgm:fillClrLst>
     <dgm:linClrLst meth="repeat">
-      <a:schemeClr val="accent2"/>
+      <a:schemeClr val="dk1"/>
     </dgm:linClrLst>
     <dgm:effectClrLst/>
     <dgm:txLinClrLst/>
@@ -569,12 +624,13 @@
   </dgm:styleLbl>
   <dgm:styleLbl name="conFgAcc1">
     <dgm:fillClrLst meth="repeat">
-      <a:schemeClr val="lt1">
+      <a:schemeClr val="dk1">
         <a:alpha val="90000"/>
+        <a:tint val="40000"/>
       </a:schemeClr>
     </dgm:fillClrLst>
     <dgm:linClrLst meth="repeat">
-      <a:schemeClr val="accent2"/>
+      <a:schemeClr val="dk1"/>
     </dgm:linClrLst>
     <dgm:effectClrLst/>
     <dgm:txLinClrLst/>
@@ -585,12 +641,13 @@
   </dgm:styleLbl>
   <dgm:styleLbl name="alignAcc1">
     <dgm:fillClrLst meth="repeat">
-      <a:schemeClr val="lt1">
+      <a:schemeClr val="dk1">
         <a:alpha val="90000"/>
+        <a:tint val="40000"/>
       </a:schemeClr>
     </dgm:fillClrLst>
     <dgm:linClrLst meth="repeat">
-      <a:schemeClr val="accent2"/>
+      <a:schemeClr val="dk1"/>
     </dgm:linClrLst>
     <dgm:effectClrLst/>
     <dgm:txLinClrLst/>
@@ -601,12 +658,13 @@
   </dgm:styleLbl>
   <dgm:styleLbl name="trAlignAcc1">
     <dgm:fillClrLst meth="repeat">
-      <a:schemeClr val="lt1">
+      <a:schemeClr val="dk1">
         <a:alpha val="40000"/>
+        <a:tint val="40000"/>
       </a:schemeClr>
     </dgm:fillClrLst>
     <dgm:linClrLst meth="repeat">
-      <a:schemeClr val="accent2"/>
+      <a:schemeClr val="dk1"/>
     </dgm:linClrLst>
     <dgm:effectClrLst/>
     <dgm:txLinClrLst/>
@@ -617,12 +675,13 @@
   </dgm:styleLbl>
   <dgm:styleLbl name="bgAcc1">
     <dgm:fillClrLst meth="repeat">
-      <a:schemeClr val="lt1">
+      <a:schemeClr val="dk1">
         <a:alpha val="90000"/>
+        <a:tint val="40000"/>
       </a:schemeClr>
     </dgm:fillClrLst>
     <dgm:linClrLst meth="repeat">
-      <a:schemeClr val="accent2"/>
+      <a:schemeClr val="dk1"/>
     </dgm:linClrLst>
     <dgm:effectClrLst/>
     <dgm:txLinClrLst/>
@@ -636,7 +695,7 @@
       <a:schemeClr val="lt1"/>
     </dgm:fillClrLst>
     <dgm:linClrLst meth="repeat">
-      <a:schemeClr val="accent2"/>
+      <a:schemeClr val="dk1"/>
     </dgm:linClrLst>
     <dgm:effectClrLst/>
     <dgm:txLinClrLst/>
@@ -650,7 +709,7 @@
       <a:schemeClr val="lt1"/>
     </dgm:fillClrLst>
     <dgm:linClrLst meth="repeat">
-      <a:schemeClr val="accent2"/>
+      <a:schemeClr val="dk1"/>
     </dgm:linClrLst>
     <dgm:effectClrLst/>
     <dgm:txLinClrLst/>
@@ -664,7 +723,7 @@
       <a:schemeClr val="lt1"/>
     </dgm:fillClrLst>
     <dgm:linClrLst meth="repeat">
-      <a:schemeClr val="accent2"/>
+      <a:schemeClr val="dk1"/>
     </dgm:linClrLst>
     <dgm:effectClrLst/>
     <dgm:txLinClrLst/>
@@ -675,15 +734,14 @@
   </dgm:styleLbl>
   <dgm:styleLbl name="fgAccFollowNode1">
     <dgm:fillClrLst meth="repeat">
-      <a:schemeClr val="accent2">
+      <a:schemeClr val="lt1">
         <a:alpha val="90000"/>
         <a:tint val="40000"/>
       </a:schemeClr>
     </dgm:fillClrLst>
     <dgm:linClrLst meth="repeat">
-      <a:schemeClr val="accent2">
+      <a:schemeClr val="dk1">
         <a:alpha val="90000"/>
-        <a:tint val="40000"/>
       </a:schemeClr>
     </dgm:linClrLst>
     <dgm:effectClrLst/>
@@ -695,15 +753,14 @@
   </dgm:styleLbl>
   <dgm:styleLbl name="alignAccFollowNode1">
     <dgm:fillClrLst meth="repeat">
-      <a:schemeClr val="accent2">
+      <a:schemeClr val="lt1">
         <a:alpha val="90000"/>
         <a:tint val="40000"/>
       </a:schemeClr>
     </dgm:fillClrLst>
     <dgm:linClrLst meth="repeat">
-      <a:schemeClr val="accent2">
+      <a:schemeClr val="dk1">
         <a:alpha val="90000"/>
-        <a:tint val="40000"/>
       </a:schemeClr>
     </dgm:linClrLst>
     <dgm:effectClrLst/>
@@ -715,15 +772,14 @@
   </dgm:styleLbl>
   <dgm:styleLbl name="bgAccFollowNode1">
     <dgm:fillClrLst meth="repeat">
-      <a:schemeClr val="accent2">
+      <a:schemeClr val="lt1">
         <a:alpha val="90000"/>
         <a:tint val="40000"/>
       </a:schemeClr>
     </dgm:fillClrLst>
     <dgm:linClrLst meth="repeat">
-      <a:schemeClr val="accent2">
+      <a:schemeClr val="dk1">
         <a:alpha val="90000"/>
-        <a:tint val="40000"/>
       </a:schemeClr>
     </dgm:linClrLst>
     <dgm:effectClrLst/>
@@ -735,12 +791,13 @@
   </dgm:styleLbl>
   <dgm:styleLbl name="fgAcc0">
     <dgm:fillClrLst meth="repeat">
-      <a:schemeClr val="lt1">
+      <a:schemeClr val="dk1">
         <a:alpha val="90000"/>
+        <a:tint val="40000"/>
       </a:schemeClr>
     </dgm:fillClrLst>
     <dgm:linClrLst meth="repeat">
-      <a:schemeClr val="accent2"/>
+      <a:schemeClr val="dk1"/>
     </dgm:linClrLst>
     <dgm:effectClrLst/>
     <dgm:txLinClrLst/>
@@ -751,12 +808,13 @@
   </dgm:styleLbl>
   <dgm:styleLbl name="fgAcc2">
     <dgm:fillClrLst meth="repeat">
-      <a:schemeClr val="lt1">
+      <a:schemeClr val="dk1">
         <a:alpha val="90000"/>
+        <a:tint val="40000"/>
       </a:schemeClr>
     </dgm:fillClrLst>
     <dgm:linClrLst meth="repeat">
-      <a:schemeClr val="accent2"/>
+      <a:schemeClr val="dk1"/>
     </dgm:linClrLst>
     <dgm:effectClrLst/>
     <dgm:txLinClrLst/>
@@ -767,12 +825,13 @@
   </dgm:styleLbl>
   <dgm:styleLbl name="fgAcc3">
     <dgm:fillClrLst meth="repeat">
-      <a:schemeClr val="lt1">
+      <a:schemeClr val="dk1">
         <a:alpha val="90000"/>
+        <a:tint val="40000"/>
       </a:schemeClr>
     </dgm:fillClrLst>
     <dgm:linClrLst meth="repeat">
-      <a:schemeClr val="accent2"/>
+      <a:schemeClr val="dk1"/>
     </dgm:linClrLst>
     <dgm:effectClrLst/>
     <dgm:txLinClrLst/>
@@ -783,12 +842,13 @@
   </dgm:styleLbl>
   <dgm:styleLbl name="fgAcc4">
     <dgm:fillClrLst meth="repeat">
-      <a:schemeClr val="lt1">
+      <a:schemeClr val="dk1">
         <a:alpha val="90000"/>
+        <a:tint val="40000"/>
       </a:schemeClr>
     </dgm:fillClrLst>
     <dgm:linClrLst meth="repeat">
-      <a:schemeClr val="accent2"/>
+      <a:schemeClr val="dk1"/>
     </dgm:linClrLst>
     <dgm:effectClrLst/>
     <dgm:txLinClrLst/>
@@ -799,12 +859,12 @@
   </dgm:styleLbl>
   <dgm:styleLbl name="bgShp">
     <dgm:fillClrLst meth="repeat">
-      <a:schemeClr val="accent2">
+      <a:schemeClr val="dk1">
         <a:tint val="40000"/>
       </a:schemeClr>
     </dgm:fillClrLst>
     <dgm:linClrLst meth="repeat">
-      <a:schemeClr val="accent2"/>
+      <a:schemeClr val="dk1"/>
     </dgm:linClrLst>
     <dgm:effectClrLst/>
     <dgm:txLinClrLst/>
@@ -815,12 +875,12 @@
   </dgm:styleLbl>
   <dgm:styleLbl name="dkBgShp">
     <dgm:fillClrLst meth="repeat">
-      <a:schemeClr val="accent2">
+      <a:schemeClr val="dk1">
         <a:shade val="80000"/>
       </a:schemeClr>
     </dgm:fillClrLst>
     <dgm:linClrLst meth="repeat">
-      <a:schemeClr val="accent2"/>
+      <a:schemeClr val="dk1"/>
     </dgm:linClrLst>
     <dgm:effectClrLst/>
     <dgm:txLinClrLst/>
@@ -831,13 +891,13 @@
   </dgm:styleLbl>
   <dgm:styleLbl name="trBgShp">
     <dgm:fillClrLst meth="repeat">
-      <a:schemeClr val="accent2">
+      <a:schemeClr val="dk1">
         <a:tint val="50000"/>
         <a:alpha val="40000"/>
       </a:schemeClr>
     </dgm:fillClrLst>
     <dgm:linClrLst meth="repeat">
-      <a:schemeClr val="accent2"/>
+      <a:schemeClr val="dk1"/>
     </dgm:linClrLst>
     <dgm:effectClrLst/>
     <dgm:txLinClrLst/>
@@ -848,7 +908,7 @@
   </dgm:styleLbl>
   <dgm:styleLbl name="fgShp">
     <dgm:fillClrLst meth="repeat">
-      <a:schemeClr val="accent2">
+      <a:schemeClr val="dk1">
         <a:tint val="60000"/>
       </a:schemeClr>
     </dgm:fillClrLst>
@@ -887,7 +947,7 @@
 <dgm:dataModel xmlns:dgm="http://schemas.openxmlformats.org/drawingml/2006/diagram" xmlns:a="http://schemas.openxmlformats.org/drawingml/2006/main">
   <dgm:ptLst>
     <dgm:pt modelId="{E2563EDB-4CA0-4D66-A203-42E75D6F9316}" type="doc">
-      <dgm:prSet loTypeId="urn:microsoft.com/office/officeart/2018/5/layout/IconCircleLabelList" loCatId="icon" qsTypeId="urn:microsoft.com/office/officeart/2005/8/quickstyle/simple1" qsCatId="simple" csTypeId="urn:microsoft.com/office/officeart/2005/8/colors/accent2_2" csCatId="accent2" phldr="1"/>
+      <dgm:prSet loTypeId="urn:microsoft.com/office/officeart/2018/5/layout/IconCircleLabelList" loCatId="icon" qsTypeId="urn:microsoft.com/office/officeart/2005/8/quickstyle/simple1" qsCatId="simple" csTypeId="urn:microsoft.com/office/officeart/2005/8/colors/accent0_1" csCatId="mainScheme" phldr="1"/>
       <dgm:spPr/>
       <dgm:t>
         <a:bodyPr/>
@@ -1038,13 +1098,7 @@
     </dgm:pt>
     <dgm:pt modelId="{758B95C8-B4F4-4372-9A1D-D0DCAAF81CA8}" type="pres">
       <dgm:prSet presAssocID="{1EC9493F-979F-4BDB-A979-31E1082ABC77}" presName="iconBgRect" presStyleLbl="bgShp" presStyleIdx="0" presStyleCnt="3"/>
-      <dgm:spPr>
-        <a:solidFill>
-          <a:srgbClr val="FF4343">
-            <a:alpha val="50196"/>
-          </a:srgbClr>
-        </a:solidFill>
-      </dgm:spPr>
+      <dgm:spPr/>
     </dgm:pt>
     <dgm:pt modelId="{7F3AA93B-461A-4EF9-8C3B-D1EBB125F8CE}" type="pres">
       <dgm:prSet presAssocID="{1EC9493F-979F-4BDB-A979-31E1082ABC77}" presName="iconRect" presStyleLbl="node1" presStyleIdx="0" presStyleCnt="3"/>
@@ -1095,13 +1149,7 @@
     </dgm:pt>
     <dgm:pt modelId="{529A66EE-EA7D-43EA-AA64-976B4FD64F84}" type="pres">
       <dgm:prSet presAssocID="{1E06A7BD-BF9B-490A-AF50-C2AFBC35EDC4}" presName="iconBgRect" presStyleLbl="bgShp" presStyleIdx="1" presStyleCnt="3"/>
-      <dgm:spPr>
-        <a:solidFill>
-          <a:srgbClr val="FF4343">
-            <a:alpha val="50196"/>
-          </a:srgbClr>
-        </a:solidFill>
-      </dgm:spPr>
+      <dgm:spPr/>
     </dgm:pt>
     <dgm:pt modelId="{209F367F-3642-42C5-A258-B284F24EAEFC}" type="pres">
       <dgm:prSet presAssocID="{1E06A7BD-BF9B-490A-AF50-C2AFBC35EDC4}" presName="iconRect" presStyleLbl="node1" presStyleIdx="1" presStyleCnt="3"/>
@@ -1149,13 +1197,7 @@
     </dgm:pt>
     <dgm:pt modelId="{08CECF67-5E1D-43BC-BDF3-A2DBBD991F6E}" type="pres">
       <dgm:prSet presAssocID="{D67C0B72-9925-4A2D-826D-632CE3629CEA}" presName="iconBgRect" presStyleLbl="bgShp" presStyleIdx="2" presStyleCnt="3"/>
-      <dgm:spPr>
-        <a:solidFill>
-          <a:srgbClr val="FF4343">
-            <a:alpha val="50196"/>
-          </a:srgbClr>
-        </a:solidFill>
-      </dgm:spPr>
+      <dgm:spPr/>
     </dgm:pt>
     <dgm:pt modelId="{3AE78956-64C4-433D-88C3-4538E3C36AD4}" type="pres">
       <dgm:prSet presAssocID="{D67C0B72-9925-4A2D-826D-632CE3629CEA}" presName="iconRect" presStyleLbl="node1" presStyleIdx="2" presStyleCnt="3"/>
@@ -1255,9 +1297,13 @@
           <a:avLst/>
         </a:prstGeom>
         <a:solidFill>
-          <a:srgbClr val="FF4343">
-            <a:alpha val="50196"/>
-          </a:srgbClr>
+          <a:schemeClr val="dk1">
+            <a:tint val="40000"/>
+            <a:hueOff val="0"/>
+            <a:satOff val="0"/>
+            <a:lumOff val="0"/>
+            <a:alphaOff val="0"/>
+          </a:schemeClr>
         </a:solidFill>
         <a:ln>
           <a:noFill/>
@@ -1308,7 +1354,8 @@
         </a:blipFill>
         <a:ln w="12700" cap="flat" cmpd="sng" algn="ctr">
           <a:solidFill>
-            <a:schemeClr val="lt1">
+            <a:schemeClr val="dk1">
+              <a:shade val="80000"/>
               <a:hueOff val="0"/>
               <a:satOff val="0"/>
               <a:lumOff val="0"/>
@@ -1410,9 +1457,13 @@
           <a:avLst/>
         </a:prstGeom>
         <a:solidFill>
-          <a:srgbClr val="FF4343">
-            <a:alpha val="50196"/>
-          </a:srgbClr>
+          <a:schemeClr val="dk1">
+            <a:tint val="40000"/>
+            <a:hueOff val="0"/>
+            <a:satOff val="0"/>
+            <a:lumOff val="0"/>
+            <a:alphaOff val="0"/>
+          </a:schemeClr>
         </a:solidFill>
         <a:ln>
           <a:noFill/>
@@ -1460,7 +1511,8 @@
         </a:blipFill>
         <a:ln w="12700" cap="flat" cmpd="sng" algn="ctr">
           <a:solidFill>
-            <a:schemeClr val="lt1">
+            <a:schemeClr val="dk1">
+              <a:shade val="80000"/>
               <a:hueOff val="0"/>
               <a:satOff val="0"/>
               <a:lumOff val="0"/>
@@ -1562,9 +1614,13 @@
           <a:avLst/>
         </a:prstGeom>
         <a:solidFill>
-          <a:srgbClr val="FF4343">
-            <a:alpha val="50196"/>
-          </a:srgbClr>
+          <a:schemeClr val="dk1">
+            <a:tint val="40000"/>
+            <a:hueOff val="0"/>
+            <a:satOff val="0"/>
+            <a:lumOff val="0"/>
+            <a:alphaOff val="0"/>
+          </a:schemeClr>
         </a:solidFill>
         <a:ln>
           <a:noFill/>
@@ -1615,7 +1671,8 @@
         </a:blipFill>
         <a:ln w="12700" cap="flat" cmpd="sng" algn="ctr">
           <a:solidFill>
-            <a:schemeClr val="lt1">
+            <a:schemeClr val="dk1">
+              <a:shade val="80000"/>
               <a:hueOff val="0"/>
               <a:satOff val="0"/>
               <a:lumOff val="0"/>
@@ -3038,7 +3095,7 @@
           <a:p>
             <a:fld id="{935336F5-A68D-9A4A-83AB-B8CD6FA5C732}" type="datetimeFigureOut">
               <a:rPr lang="en-US" smtClean="0"/>
-              <a:t>10/13/2019</a:t>
+              <a:t>10/14/2019</a:t>
             </a:fld>
             <a:endParaRPr lang="en-US"/>
           </a:p>
@@ -5541,7 +5598,7 @@
           <a:p>
             <a:fld id="{D8AC05B1-2526-7C44-8A74-66C916069F4A}" type="datetime1">
               <a:rPr lang="en-US" smtClean="0"/>
-              <a:t>10/13/2019</a:t>
+              <a:t>10/14/2019</a:t>
             </a:fld>
             <a:endParaRPr lang="en-US"/>
           </a:p>
@@ -5732,7 +5789,7 @@
           <a:p>
             <a:fld id="{C0E5C021-D243-504D-84B8-D45D829E8B6B}" type="datetime1">
               <a:rPr lang="en-US" smtClean="0"/>
-              <a:t>10/13/2019</a:t>
+              <a:t>10/14/2019</a:t>
             </a:fld>
             <a:endParaRPr lang="en-US"/>
           </a:p>
@@ -5913,7 +5970,7 @@
           <a:p>
             <a:fld id="{B6F93F85-28A1-8344-9763-EF19E19F9128}" type="datetime1">
               <a:rPr lang="en-US" smtClean="0"/>
-              <a:t>10/13/2019</a:t>
+              <a:t>10/14/2019</a:t>
             </a:fld>
             <a:endParaRPr lang="en-US"/>
           </a:p>
@@ -6177,7 +6234,7 @@
           <a:p>
             <a:fld id="{A2B5E9FB-9AD4-754B-A772-6D3733DD5BAC}" type="datetime1">
               <a:rPr lang="en-US" smtClean="0"/>
-              <a:t>10/13/2019</a:t>
+              <a:t>10/14/2019</a:t>
             </a:fld>
             <a:endParaRPr lang="en-US"/>
           </a:p>
@@ -6420,7 +6477,7 @@
           <a:p>
             <a:fld id="{3140DF9E-9222-EE48-A64D-28DE5FAE4784}" type="datetime1">
               <a:rPr lang="en-US" smtClean="0"/>
-              <a:t>10/13/2019</a:t>
+              <a:t>10/14/2019</a:t>
             </a:fld>
             <a:endParaRPr lang="en-US"/>
           </a:p>
@@ -6798,7 +6855,7 @@
           <a:p>
             <a:fld id="{A61490FA-57A5-0041-9FDC-ACD83A9AA0E7}" type="datetime1">
               <a:rPr lang="en-US" smtClean="0"/>
-              <a:t>10/13/2019</a:t>
+              <a:t>10/14/2019</a:t>
             </a:fld>
             <a:endParaRPr lang="en-US"/>
           </a:p>
@@ -6927,7 +6984,7 @@
           <a:p>
             <a:fld id="{7E8290BC-2F66-E549-BF33-0BE20A5801B5}" type="datetime1">
               <a:rPr lang="en-US" smtClean="0"/>
-              <a:t>10/13/2019</a:t>
+              <a:t>10/14/2019</a:t>
             </a:fld>
             <a:endParaRPr lang="en-US"/>
           </a:p>
@@ -7033,7 +7090,7 @@
           <a:p>
             <a:fld id="{3BC728CC-7587-8545-9431-C9A8BB34EC62}" type="datetime1">
               <a:rPr lang="en-US" smtClean="0"/>
-              <a:t>10/13/2019</a:t>
+              <a:t>10/14/2019</a:t>
             </a:fld>
             <a:endParaRPr lang="en-US"/>
           </a:p>
@@ -7321,7 +7378,7 @@
           <a:p>
             <a:fld id="{9A66CD15-5422-0542-9CE8-BC312846333A}" type="datetime1">
               <a:rPr lang="en-US" smtClean="0"/>
-              <a:t>10/13/2019</a:t>
+              <a:t>10/14/2019</a:t>
             </a:fld>
             <a:endParaRPr lang="en-US"/>
           </a:p>
@@ -7589,7 +7646,7 @@
           <a:p>
             <a:fld id="{2A2384D1-AE54-4D4A-B83F-6EAD03BEB987}" type="datetime1">
               <a:rPr lang="en-US" smtClean="0"/>
-              <a:t>10/13/2019</a:t>
+              <a:t>10/14/2019</a:t>
             </a:fld>
             <a:endParaRPr lang="en-US"/>
           </a:p>
@@ -9297,6 +9354,36 @@
           <a:chExt cx="0" cy="0"/>
         </a:xfrm>
       </p:grpSpPr>
+      <p:pic>
+        <p:nvPicPr>
+          <p:cNvPr id="2" name="Picture 1" descr="A screenshot of a cell phone&#10;&#10;Description automatically generated">
+            <a:extLst>
+              <a:ext uri="{FF2B5EF4-FFF2-40B4-BE49-F238E27FC236}">
+                <a16:creationId xmlns:a16="http://schemas.microsoft.com/office/drawing/2014/main" id="{F26E0AD9-D19F-4666-B26E-0A76DD0B038C}"/>
+              </a:ext>
+            </a:extLst>
+          </p:cNvPr>
+          <p:cNvPicPr>
+            <a:picLocks noChangeAspect="1"/>
+          </p:cNvPicPr>
+          <p:nvPr/>
+        </p:nvPicPr>
+        <p:blipFill>
+          <a:blip r:embed="rId3"/>
+          <a:stretch>
+            <a:fillRect/>
+          </a:stretch>
+        </p:blipFill>
+        <p:spPr>
+          <a:xfrm>
+            <a:off x="241300" y="709423"/>
+            <a:ext cx="8661399" cy="4677154"/>
+          </a:xfrm>
+          <a:prstGeom prst="rect">
+            <a:avLst/>
+          </a:prstGeom>
+        </p:spPr>
+      </p:pic>
       <p:sp>
         <p:nvSpPr>
           <p:cNvPr id="4" name="Slide Number Placeholder 3"/>
@@ -9349,34 +9436,6 @@
           </a:p>
         </p:txBody>
       </p:sp>
-      <p:pic>
-        <p:nvPicPr>
-          <p:cNvPr id="7" name="Picture 6" descr="A screenshot of a cell phone&#10;&#10;Description automatically generated">
-            <a:extLst>
-              <a:ext uri="{FF2B5EF4-FFF2-40B4-BE49-F238E27FC236}">
-                <a16:creationId xmlns:a16="http://schemas.microsoft.com/office/drawing/2014/main" id="{8A3A1CA2-53F8-40B2-BE41-3E83B0684187}"/>
-              </a:ext>
-            </a:extLst>
-          </p:cNvPr>
-          <p:cNvPicPr/>
-          <p:nvPr/>
-        </p:nvPicPr>
-        <p:blipFill>
-          <a:blip r:embed="rId3"/>
-          <a:stretch>
-            <a:fillRect/>
-          </a:stretch>
-        </p:blipFill>
-        <p:spPr>
-          <a:xfrm>
-            <a:off x="482600" y="873125"/>
-            <a:ext cx="8178799" cy="5111748"/>
-          </a:xfrm>
-          <a:prstGeom prst="rect">
-            <a:avLst/>
-          </a:prstGeom>
-        </p:spPr>
-      </p:pic>
     </p:spTree>
     <p:extLst>
       <p:ext uri="{BB962C8B-B14F-4D97-AF65-F5344CB8AC3E}">
@@ -9432,7 +9491,7 @@
           <a:p>
             <a:r>
               <a:rPr lang="en-US" dirty="0"/>
-              <a:t>Display Venn-Diagram</a:t>
+              <a:t>Display Venn-Diagram?</a:t>
             </a:r>
           </a:p>
         </p:txBody>
@@ -11987,7 +12046,7 @@
             <p:ph idx="1"/>
             <p:extLst>
               <p:ext uri="{D42A27DB-BD31-4B8C-83A1-F6EECF244321}">
-                <p14:modId xmlns:p14="http://schemas.microsoft.com/office/powerpoint/2010/main" val="3535253657"/>
+                <p14:modId xmlns:p14="http://schemas.microsoft.com/office/powerpoint/2010/main" val="2298465694"/>
               </p:ext>
             </p:extLst>
           </p:nvPr>
@@ -12606,11 +12665,11 @@
   <p:clrMapOvr>
     <a:masterClrMapping/>
   </p:clrMapOvr>
-  <mc:AlternateContent xmlns:mc="http://schemas.openxmlformats.org/markup-compatibility/2006">
-    <mc:Choice xmlns:p14="http://schemas.microsoft.com/office/powerpoint/2010/main" Requires="p14">
+  <mc:AlternateContent xmlns:mc="http://schemas.openxmlformats.org/markup-compatibility/2006" xmlns:p14="http://schemas.microsoft.com/office/powerpoint/2010/main">
+    <mc:Choice Requires="p14">
       <p:transition p14:dur="10" advClick="0" advTm="15000"/>
     </mc:Choice>
-    <mc:Fallback>
+    <mc:Fallback xmlns="">
       <p:transition advClick="0" advTm="15000"/>
     </mc:Fallback>
   </mc:AlternateContent>
@@ -13982,29 +14041,36 @@
           <a:chExt cx="0" cy="0"/>
         </a:xfrm>
       </p:grpSpPr>
-      <p:sp>
-        <p:nvSpPr>
-          <p:cNvPr id="4" name="Slide Number Placeholder 3"/>
-          <p:cNvSpPr>
-            <a:spLocks noGrp="1"/>
-          </p:cNvSpPr>
-          <p:nvPr>
-            <p:ph type="sldNum" sz="quarter" idx="12"/>
-          </p:nvPr>
-        </p:nvSpPr>
-        <p:spPr/>
-        <p:txBody>
-          <a:bodyPr/>
-          <a:lstStyle/>
-          <a:p>
-            <a:fld id="{38327683-8978-6B4B-9130-4A6A841F0549}" type="slidenum">
-              <a:rPr lang="en-US" smtClean="0"/>
-              <a:t>7</a:t>
-            </a:fld>
-            <a:endParaRPr lang="en-US" dirty="0"/>
-          </a:p>
-        </p:txBody>
-      </p:sp>
+      <p:pic>
+        <p:nvPicPr>
+          <p:cNvPr id="2" name="Picture 1">
+            <a:extLst>
+              <a:ext uri="{FF2B5EF4-FFF2-40B4-BE49-F238E27FC236}">
+                <a16:creationId xmlns:a16="http://schemas.microsoft.com/office/drawing/2014/main" id="{A8D7AA56-F3B7-48E8-8800-2DBC26212D08}"/>
+              </a:ext>
+            </a:extLst>
+          </p:cNvPr>
+          <p:cNvPicPr>
+            <a:picLocks noChangeAspect="1"/>
+          </p:cNvPicPr>
+          <p:nvPr/>
+        </p:nvPicPr>
+        <p:blipFill>
+          <a:blip r:embed="rId3"/>
+          <a:stretch>
+            <a:fillRect/>
+          </a:stretch>
+        </p:blipFill>
+        <p:spPr>
+          <a:xfrm>
+            <a:off x="796958" y="713898"/>
+            <a:ext cx="7718392" cy="5586565"/>
+          </a:xfrm>
+          <a:prstGeom prst="rect">
+            <a:avLst/>
+          </a:prstGeom>
+        </p:spPr>
+      </p:pic>
       <p:grpSp>
         <p:nvGrpSpPr>
           <p:cNvPr id="28" name="Group 27">
@@ -14019,10 +14085,10 @@
         </p:nvGrpSpPr>
         <p:grpSpPr>
           <a:xfrm>
-            <a:off x="801278" y="838987"/>
-            <a:ext cx="7714072" cy="5448322"/>
-            <a:chOff x="801278" y="838987"/>
-            <a:chExt cx="7714072" cy="5448322"/>
+            <a:off x="1253552" y="838987"/>
+            <a:ext cx="7286558" cy="3723452"/>
+            <a:chOff x="1228791" y="838987"/>
+            <a:chExt cx="7286558" cy="3723452"/>
           </a:xfrm>
         </p:grpSpPr>
         <p:grpSp>
@@ -14039,439 +14105,66 @@
           </p:nvGrpSpPr>
           <p:grpSpPr>
             <a:xfrm>
-              <a:off x="801278" y="838987"/>
-              <a:ext cx="7714072" cy="5448322"/>
-              <a:chOff x="801278" y="838987"/>
-              <a:chExt cx="7714072" cy="5448322"/>
+              <a:off x="3685880" y="838987"/>
+              <a:ext cx="4829469" cy="1155477"/>
+              <a:chOff x="3685880" y="838987"/>
+              <a:chExt cx="4829469" cy="1155477"/>
             </a:xfrm>
           </p:grpSpPr>
-          <p:grpSp>
-            <p:nvGrpSpPr>
-              <p:cNvPr id="18" name="Group 17">
+          <p:sp>
+            <p:nvSpPr>
+              <p:cNvPr id="9" name="Rectangle 8">
                 <a:extLst>
                   <a:ext uri="{FF2B5EF4-FFF2-40B4-BE49-F238E27FC236}">
-                    <a16:creationId xmlns:a16="http://schemas.microsoft.com/office/drawing/2014/main" id="{BBCA4437-7468-41D1-A5BC-C82B56FF68BE}"/>
+                    <a16:creationId xmlns:a16="http://schemas.microsoft.com/office/drawing/2014/main" id="{FED896E6-4764-49A3-9D14-39CA3829CDFB}"/>
                   </a:ext>
                 </a:extLst>
               </p:cNvPr>
-              <p:cNvGrpSpPr/>
+              <p:cNvSpPr/>
               <p:nvPr/>
-            </p:nvGrpSpPr>
-            <p:grpSpPr>
+            </p:nvSpPr>
+            <p:spPr>
               <a:xfrm>
-                <a:off x="801278" y="838987"/>
-                <a:ext cx="7714072" cy="5448322"/>
-                <a:chOff x="1756612" y="1372999"/>
-                <a:chExt cx="6758738" cy="4895455"/>
+                <a:off x="7118096" y="838987"/>
+                <a:ext cx="1397253" cy="1155477"/>
               </a:xfrm>
-            </p:grpSpPr>
-            <p:pic>
-              <p:nvPicPr>
-                <p:cNvPr id="8" name="Picture 7">
-                  <a:extLst>
-                    <a:ext uri="{FF2B5EF4-FFF2-40B4-BE49-F238E27FC236}">
-                      <a16:creationId xmlns:a16="http://schemas.microsoft.com/office/drawing/2014/main" id="{08427C7B-3384-4E37-A891-212876AD4B76}"/>
-                    </a:ext>
-                  </a:extLst>
-                </p:cNvPr>
-                <p:cNvPicPr/>
-                <p:nvPr/>
-              </p:nvPicPr>
-              <p:blipFill>
-                <a:blip r:embed="rId3"/>
-                <a:stretch>
-                  <a:fillRect/>
-                </a:stretch>
-              </p:blipFill>
-              <p:spPr>
-                <a:xfrm>
-                  <a:off x="1756612" y="1373000"/>
-                  <a:ext cx="6758738" cy="4895454"/>
-                </a:xfrm>
-                <a:prstGeom prst="rect">
-                  <a:avLst/>
-                </a:prstGeom>
-              </p:spPr>
-            </p:pic>
-            <p:sp>
-              <p:nvSpPr>
-                <p:cNvPr id="9" name="Rectangle 8">
-                  <a:extLst>
-                    <a:ext uri="{FF2B5EF4-FFF2-40B4-BE49-F238E27FC236}">
-                      <a16:creationId xmlns:a16="http://schemas.microsoft.com/office/drawing/2014/main" id="{FED896E6-4764-49A3-9D14-39CA3829CDFB}"/>
-                    </a:ext>
-                  </a:extLst>
-                </p:cNvPr>
-                <p:cNvSpPr/>
-                <p:nvPr/>
-              </p:nvSpPr>
-              <p:spPr>
-                <a:xfrm>
-                  <a:off x="7291137" y="1372999"/>
-                  <a:ext cx="1224213" cy="1038225"/>
-                </a:xfrm>
-                <a:prstGeom prst="rect">
-                  <a:avLst/>
-                </a:prstGeom>
+              <a:prstGeom prst="rect">
+                <a:avLst/>
+              </a:prstGeom>
+              <a:solidFill>
+                <a:schemeClr val="bg1"/>
+              </a:solidFill>
+              <a:ln>
                 <a:solidFill>
                   <a:schemeClr val="bg1"/>
                 </a:solidFill>
-                <a:ln>
-                  <a:solidFill>
-                    <a:schemeClr val="bg1"/>
-                  </a:solidFill>
-                </a:ln>
-              </p:spPr>
-              <p:style>
-                <a:lnRef idx="2">
-                  <a:schemeClr val="accent1">
-                    <a:shade val="50000"/>
-                  </a:schemeClr>
-                </a:lnRef>
-                <a:fillRef idx="1">
-                  <a:schemeClr val="accent1"/>
-                </a:fillRef>
-                <a:effectRef idx="0">
-                  <a:schemeClr val="accent1"/>
-                </a:effectRef>
-                <a:fontRef idx="minor">
-                  <a:schemeClr val="lt1"/>
-                </a:fontRef>
-              </p:style>
-              <p:txBody>
-                <a:bodyPr rtlCol="0" anchor="ctr"/>
-                <a:lstStyle/>
-                <a:p>
-                  <a:pPr algn="ctr"/>
-                  <a:endParaRPr lang="en-US"/>
-                </a:p>
-              </p:txBody>
-            </p:sp>
-            <p:sp>
-              <p:nvSpPr>
-                <p:cNvPr id="12" name="Rectangle 11">
-                  <a:extLst>
-                    <a:ext uri="{FF2B5EF4-FFF2-40B4-BE49-F238E27FC236}">
-                      <a16:creationId xmlns:a16="http://schemas.microsoft.com/office/drawing/2014/main" id="{2385EEE0-9FB5-4EFF-9F8C-545F71DC8C55}"/>
-                    </a:ext>
-                  </a:extLst>
-                </p:cNvPr>
-                <p:cNvSpPr/>
-                <p:nvPr/>
-              </p:nvSpPr>
-              <p:spPr>
-                <a:xfrm>
-                  <a:off x="2343636" y="1923068"/>
-                  <a:ext cx="720075" cy="169683"/>
-                </a:xfrm>
-                <a:prstGeom prst="rect">
-                  <a:avLst/>
-                </a:prstGeom>
-                <a:solidFill>
-                  <a:schemeClr val="bg1"/>
-                </a:solidFill>
-                <a:ln>
-                  <a:solidFill>
-                    <a:schemeClr val="bg1"/>
-                  </a:solidFill>
-                </a:ln>
-              </p:spPr>
-              <p:style>
-                <a:lnRef idx="2">
-                  <a:schemeClr val="accent1">
-                    <a:shade val="50000"/>
-                  </a:schemeClr>
-                </a:lnRef>
-                <a:fillRef idx="1">
-                  <a:schemeClr val="accent1"/>
-                </a:fillRef>
-                <a:effectRef idx="0">
-                  <a:schemeClr val="accent1"/>
-                </a:effectRef>
-                <a:fontRef idx="minor">
-                  <a:schemeClr val="lt1"/>
-                </a:fontRef>
-              </p:style>
-              <p:txBody>
-                <a:bodyPr rtlCol="0" anchor="ctr"/>
-                <a:lstStyle/>
-                <a:p>
-                  <a:pPr algn="ctr"/>
-                  <a:endParaRPr lang="en-US"/>
-                </a:p>
-              </p:txBody>
-            </p:sp>
-            <p:sp>
-              <p:nvSpPr>
-                <p:cNvPr id="13" name="Rectangle 12">
-                  <a:extLst>
-                    <a:ext uri="{FF2B5EF4-FFF2-40B4-BE49-F238E27FC236}">
-                      <a16:creationId xmlns:a16="http://schemas.microsoft.com/office/drawing/2014/main" id="{C0922AC4-9E71-4F75-B655-0EB44E1A38F1}"/>
-                    </a:ext>
-                  </a:extLst>
-                </p:cNvPr>
-                <p:cNvSpPr/>
-                <p:nvPr/>
-              </p:nvSpPr>
-              <p:spPr>
-                <a:xfrm>
-                  <a:off x="3216111" y="3112416"/>
-                  <a:ext cx="720075" cy="169683"/>
-                </a:xfrm>
-                <a:prstGeom prst="rect">
-                  <a:avLst/>
-                </a:prstGeom>
-                <a:solidFill>
-                  <a:schemeClr val="bg1"/>
-                </a:solidFill>
-                <a:ln>
-                  <a:solidFill>
-                    <a:schemeClr val="bg1"/>
-                  </a:solidFill>
-                </a:ln>
-              </p:spPr>
-              <p:style>
-                <a:lnRef idx="2">
-                  <a:schemeClr val="accent1">
-                    <a:shade val="50000"/>
-                  </a:schemeClr>
-                </a:lnRef>
-                <a:fillRef idx="1">
-                  <a:schemeClr val="accent1"/>
-                </a:fillRef>
-                <a:effectRef idx="0">
-                  <a:schemeClr val="accent1"/>
-                </a:effectRef>
-                <a:fontRef idx="minor">
-                  <a:schemeClr val="lt1"/>
-                </a:fontRef>
-              </p:style>
-              <p:txBody>
-                <a:bodyPr rtlCol="0" anchor="ctr"/>
-                <a:lstStyle/>
-                <a:p>
-                  <a:pPr algn="ctr"/>
-                  <a:endParaRPr lang="en-US"/>
-                </a:p>
-              </p:txBody>
-            </p:sp>
-            <p:sp>
-              <p:nvSpPr>
-                <p:cNvPr id="14" name="Rectangle 13">
-                  <a:extLst>
-                    <a:ext uri="{FF2B5EF4-FFF2-40B4-BE49-F238E27FC236}">
-                      <a16:creationId xmlns:a16="http://schemas.microsoft.com/office/drawing/2014/main" id="{34CEB076-EC4A-494B-B32C-08D6B978D8EC}"/>
-                    </a:ext>
-                  </a:extLst>
-                </p:cNvPr>
-                <p:cNvSpPr/>
-                <p:nvPr/>
-              </p:nvSpPr>
-              <p:spPr>
-                <a:xfrm>
-                  <a:off x="3936186" y="3149337"/>
-                  <a:ext cx="720075" cy="169683"/>
-                </a:xfrm>
-                <a:prstGeom prst="rect">
-                  <a:avLst/>
-                </a:prstGeom>
-                <a:solidFill>
-                  <a:schemeClr val="bg1"/>
-                </a:solidFill>
-                <a:ln>
-                  <a:solidFill>
-                    <a:schemeClr val="bg1"/>
-                  </a:solidFill>
-                </a:ln>
-              </p:spPr>
-              <p:style>
-                <a:lnRef idx="2">
-                  <a:schemeClr val="accent1">
-                    <a:shade val="50000"/>
-                  </a:schemeClr>
-                </a:lnRef>
-                <a:fillRef idx="1">
-                  <a:schemeClr val="accent1"/>
-                </a:fillRef>
-                <a:effectRef idx="0">
-                  <a:schemeClr val="accent1"/>
-                </a:effectRef>
-                <a:fontRef idx="minor">
-                  <a:schemeClr val="lt1"/>
-                </a:fontRef>
-              </p:style>
-              <p:txBody>
-                <a:bodyPr rtlCol="0" anchor="ctr"/>
-                <a:lstStyle/>
-                <a:p>
-                  <a:pPr algn="ctr"/>
-                  <a:endParaRPr lang="en-US"/>
-                </a:p>
-              </p:txBody>
-            </p:sp>
-            <p:sp>
-              <p:nvSpPr>
-                <p:cNvPr id="15" name="Rectangle 14">
-                  <a:extLst>
-                    <a:ext uri="{FF2B5EF4-FFF2-40B4-BE49-F238E27FC236}">
-                      <a16:creationId xmlns:a16="http://schemas.microsoft.com/office/drawing/2014/main" id="{BE49844E-59BA-445D-8225-9652202DF228}"/>
-                    </a:ext>
-                  </a:extLst>
-                </p:cNvPr>
-                <p:cNvSpPr/>
-                <p:nvPr/>
-              </p:nvSpPr>
-              <p:spPr>
-                <a:xfrm>
-                  <a:off x="4918145" y="3667541"/>
-                  <a:ext cx="720075" cy="169683"/>
-                </a:xfrm>
-                <a:prstGeom prst="rect">
-                  <a:avLst/>
-                </a:prstGeom>
-                <a:solidFill>
-                  <a:schemeClr val="bg1"/>
-                </a:solidFill>
-                <a:ln>
-                  <a:solidFill>
-                    <a:schemeClr val="bg1"/>
-                  </a:solidFill>
-                </a:ln>
-              </p:spPr>
-              <p:style>
-                <a:lnRef idx="2">
-                  <a:schemeClr val="accent1">
-                    <a:shade val="50000"/>
-                  </a:schemeClr>
-                </a:lnRef>
-                <a:fillRef idx="1">
-                  <a:schemeClr val="accent1"/>
-                </a:fillRef>
-                <a:effectRef idx="0">
-                  <a:schemeClr val="accent1"/>
-                </a:effectRef>
-                <a:fontRef idx="minor">
-                  <a:schemeClr val="lt1"/>
-                </a:fontRef>
-              </p:style>
-              <p:txBody>
-                <a:bodyPr rtlCol="0" anchor="ctr"/>
-                <a:lstStyle/>
-                <a:p>
-                  <a:pPr algn="ctr"/>
-                  <a:endParaRPr lang="en-US"/>
-                </a:p>
-              </p:txBody>
-            </p:sp>
-            <p:sp>
-              <p:nvSpPr>
-                <p:cNvPr id="16" name="Rectangle 15">
-                  <a:extLst>
-                    <a:ext uri="{FF2B5EF4-FFF2-40B4-BE49-F238E27FC236}">
-                      <a16:creationId xmlns:a16="http://schemas.microsoft.com/office/drawing/2014/main" id="{9DC7B0C2-11B9-4F6F-A01D-D06D45E52090}"/>
-                    </a:ext>
-                  </a:extLst>
-                </p:cNvPr>
-                <p:cNvSpPr/>
-                <p:nvPr/>
-              </p:nvSpPr>
-              <p:spPr>
-                <a:xfrm>
-                  <a:off x="5638220" y="3904782"/>
-                  <a:ext cx="720075" cy="169683"/>
-                </a:xfrm>
-                <a:prstGeom prst="rect">
-                  <a:avLst/>
-                </a:prstGeom>
-                <a:solidFill>
-                  <a:schemeClr val="bg1"/>
-                </a:solidFill>
-                <a:ln>
-                  <a:solidFill>
-                    <a:schemeClr val="bg1"/>
-                  </a:solidFill>
-                </a:ln>
-              </p:spPr>
-              <p:style>
-                <a:lnRef idx="2">
-                  <a:schemeClr val="accent1">
-                    <a:shade val="50000"/>
-                  </a:schemeClr>
-                </a:lnRef>
-                <a:fillRef idx="1">
-                  <a:schemeClr val="accent1"/>
-                </a:fillRef>
-                <a:effectRef idx="0">
-                  <a:schemeClr val="accent1"/>
-                </a:effectRef>
-                <a:fontRef idx="minor">
-                  <a:schemeClr val="lt1"/>
-                </a:fontRef>
-              </p:style>
-              <p:txBody>
-                <a:bodyPr rtlCol="0" anchor="ctr"/>
-                <a:lstStyle/>
-                <a:p>
-                  <a:pPr algn="ctr"/>
-                  <a:endParaRPr lang="en-US"/>
-                </a:p>
-              </p:txBody>
-            </p:sp>
-            <p:sp>
-              <p:nvSpPr>
-                <p:cNvPr id="17" name="Rectangle 16">
-                  <a:extLst>
-                    <a:ext uri="{FF2B5EF4-FFF2-40B4-BE49-F238E27FC236}">
-                      <a16:creationId xmlns:a16="http://schemas.microsoft.com/office/drawing/2014/main" id="{DA853D16-F0E7-44AA-934E-1FBDB5B360AD}"/>
-                    </a:ext>
-                  </a:extLst>
-                </p:cNvPr>
-                <p:cNvSpPr/>
-                <p:nvPr/>
-              </p:nvSpPr>
-              <p:spPr>
-                <a:xfrm>
-                  <a:off x="6667313" y="4669924"/>
-                  <a:ext cx="720075" cy="169683"/>
-                </a:xfrm>
-                <a:prstGeom prst="rect">
-                  <a:avLst/>
-                </a:prstGeom>
-                <a:solidFill>
-                  <a:schemeClr val="bg1"/>
-                </a:solidFill>
-                <a:ln>
-                  <a:solidFill>
-                    <a:schemeClr val="bg1"/>
-                  </a:solidFill>
-                </a:ln>
-              </p:spPr>
-              <p:style>
-                <a:lnRef idx="2">
-                  <a:schemeClr val="accent1">
-                    <a:shade val="50000"/>
-                  </a:schemeClr>
-                </a:lnRef>
-                <a:fillRef idx="1">
-                  <a:schemeClr val="accent1"/>
-                </a:fillRef>
-                <a:effectRef idx="0">
-                  <a:schemeClr val="accent1"/>
-                </a:effectRef>
-                <a:fontRef idx="minor">
-                  <a:schemeClr val="lt1"/>
-                </a:fontRef>
-              </p:style>
-              <p:txBody>
-                <a:bodyPr rtlCol="0" anchor="ctr"/>
-                <a:lstStyle/>
-                <a:p>
-                  <a:pPr algn="ctr"/>
-                  <a:endParaRPr lang="en-US"/>
-                </a:p>
-              </p:txBody>
-            </p:sp>
-          </p:grpSp>
+              </a:ln>
+            </p:spPr>
+            <p:style>
+              <a:lnRef idx="2">
+                <a:schemeClr val="accent1">
+                  <a:shade val="50000"/>
+                </a:schemeClr>
+              </a:lnRef>
+              <a:fillRef idx="1">
+                <a:schemeClr val="accent1"/>
+              </a:fillRef>
+              <a:effectRef idx="0">
+                <a:schemeClr val="accent1"/>
+              </a:effectRef>
+              <a:fontRef idx="minor">
+                <a:schemeClr val="lt1"/>
+              </a:fontRef>
+            </p:style>
+            <p:txBody>
+              <a:bodyPr rtlCol="0" anchor="ctr"/>
+              <a:lstStyle/>
+              <a:p>
+                <a:pPr algn="ctr"/>
+                <a:endParaRPr lang="en-US"/>
+              </a:p>
+            </p:txBody>
+          </p:sp>
           <p:sp>
             <p:nvSpPr>
               <p:cNvPr id="19" name="Rectangle 18">
@@ -14541,7 +14234,7 @@
           </p:nvSpPr>
           <p:spPr>
             <a:xfrm>
-              <a:off x="1536568" y="1708776"/>
+              <a:off x="1228791" y="1470031"/>
               <a:ext cx="615553" cy="930729"/>
             </a:xfrm>
             <a:prstGeom prst="rect">
@@ -14576,7 +14269,7 @@
           </p:nvSpPr>
           <p:spPr>
             <a:xfrm>
-              <a:off x="2499523" y="3002540"/>
+              <a:off x="2438310" y="2687693"/>
               <a:ext cx="615553" cy="930729"/>
             </a:xfrm>
             <a:prstGeom prst="rect">
@@ -14611,7 +14304,7 @@
           </p:nvSpPr>
           <p:spPr>
             <a:xfrm>
-              <a:off x="3481485" y="3041817"/>
+              <a:off x="3699768" y="2700981"/>
               <a:ext cx="615553" cy="930729"/>
             </a:xfrm>
             <a:prstGeom prst="rect">
@@ -14646,7 +14339,7 @@
           </p:nvSpPr>
           <p:spPr>
             <a:xfrm>
-              <a:off x="4435167" y="3618422"/>
+              <a:off x="4933435" y="3325880"/>
               <a:ext cx="615553" cy="930729"/>
             </a:xfrm>
             <a:prstGeom prst="rect">
@@ -14681,7 +14374,7 @@
           </p:nvSpPr>
           <p:spPr>
             <a:xfrm>
-              <a:off x="5407701" y="3902800"/>
+              <a:off x="6237260" y="3631710"/>
               <a:ext cx="615553" cy="930729"/>
             </a:xfrm>
             <a:prstGeom prst="rect">
@@ -14717,7 +14410,7 @@
           </p:nvSpPr>
           <p:spPr>
             <a:xfrm>
-              <a:off x="6380237" y="3791245"/>
+              <a:off x="7480664" y="3544888"/>
               <a:ext cx="615553" cy="930729"/>
             </a:xfrm>
             <a:prstGeom prst="rect">
@@ -14738,60 +14431,6 @@
             </a:p>
           </p:txBody>
         </p:sp>
-        <p:sp>
-          <p:nvSpPr>
-            <p:cNvPr id="27" name="Rectangle 26">
-              <a:extLst>
-                <a:ext uri="{FF2B5EF4-FFF2-40B4-BE49-F238E27FC236}">
-                  <a16:creationId xmlns:a16="http://schemas.microsoft.com/office/drawing/2014/main" id="{4A278F78-5F61-4534-BE37-02B26FDB27AB}"/>
-                </a:ext>
-              </a:extLst>
-            </p:cNvPr>
-            <p:cNvSpPr/>
-            <p:nvPr/>
-          </p:nvSpPr>
-          <p:spPr>
-            <a:xfrm>
-              <a:off x="801278" y="2488676"/>
-              <a:ext cx="397161" cy="1302569"/>
-            </a:xfrm>
-            <a:prstGeom prst="rect">
-              <a:avLst/>
-            </a:prstGeom>
-            <a:solidFill>
-              <a:schemeClr val="bg1"/>
-            </a:solidFill>
-            <a:ln>
-              <a:solidFill>
-                <a:schemeClr val="bg1"/>
-              </a:solidFill>
-            </a:ln>
-          </p:spPr>
-          <p:style>
-            <a:lnRef idx="2">
-              <a:schemeClr val="accent1">
-                <a:shade val="50000"/>
-              </a:schemeClr>
-            </a:lnRef>
-            <a:fillRef idx="1">
-              <a:schemeClr val="accent1"/>
-            </a:fillRef>
-            <a:effectRef idx="0">
-              <a:schemeClr val="accent1"/>
-            </a:effectRef>
-            <a:fontRef idx="minor">
-              <a:schemeClr val="lt1"/>
-            </a:fontRef>
-          </p:style>
-          <p:txBody>
-            <a:bodyPr rtlCol="0" anchor="ctr"/>
-            <a:lstStyle/>
-            <a:p>
-              <a:pPr algn="ctr"/>
-              <a:endParaRPr lang="en-US"/>
-            </a:p>
-          </p:txBody>
-        </p:sp>
       </p:grpSp>
       <p:pic>
         <p:nvPicPr>
@@ -14828,6 +14467,29 @@
           </a:xfrm>
         </p:spPr>
       </p:pic>
+      <p:sp>
+        <p:nvSpPr>
+          <p:cNvPr id="4" name="Slide Number Placeholder 3"/>
+          <p:cNvSpPr>
+            <a:spLocks noGrp="1"/>
+          </p:cNvSpPr>
+          <p:nvPr>
+            <p:ph type="sldNum" sz="quarter" idx="12"/>
+          </p:nvPr>
+        </p:nvSpPr>
+        <p:spPr/>
+        <p:txBody>
+          <a:bodyPr/>
+          <a:lstStyle/>
+          <a:p>
+            <a:fld id="{38327683-8978-6B4B-9130-4A6A841F0549}" type="slidenum">
+              <a:rPr lang="en-US" smtClean="0"/>
+              <a:t>7</a:t>
+            </a:fld>
+            <a:endParaRPr lang="en-US" dirty="0"/>
+          </a:p>
+        </p:txBody>
+      </p:sp>
     </p:spTree>
     <p:extLst>
       <p:ext uri="{BB962C8B-B14F-4D97-AF65-F5344CB8AC3E}">

</xml_diff>

<commit_message>
Updated the presentation and added the Poster draft
</commit_message>
<xml_diff>
--- a/MSDSPresentationDRAFT.pptx
+++ b/MSDSPresentationDRAFT.pptx
@@ -3096,7 +3096,7 @@
           <a:p>
             <a:fld id="{935336F5-A68D-9A4A-83AB-B8CD6FA5C732}" type="datetimeFigureOut">
               <a:rPr lang="en-US" smtClean="0"/>
-              <a:t>10/16/2019</a:t>
+              <a:t>10/21/2019</a:t>
             </a:fld>
             <a:endParaRPr lang="en-US"/>
           </a:p>
@@ -5719,7 +5719,7 @@
           <a:p>
             <a:fld id="{D8AC05B1-2526-7C44-8A74-66C916069F4A}" type="datetime1">
               <a:rPr lang="en-US" smtClean="0"/>
-              <a:t>10/16/2019</a:t>
+              <a:t>10/21/2019</a:t>
             </a:fld>
             <a:endParaRPr lang="en-US"/>
           </a:p>
@@ -5910,7 +5910,7 @@
           <a:p>
             <a:fld id="{C0E5C021-D243-504D-84B8-D45D829E8B6B}" type="datetime1">
               <a:rPr lang="en-US" smtClean="0"/>
-              <a:t>10/16/2019</a:t>
+              <a:t>10/21/2019</a:t>
             </a:fld>
             <a:endParaRPr lang="en-US"/>
           </a:p>
@@ -6091,7 +6091,7 @@
           <a:p>
             <a:fld id="{B6F93F85-28A1-8344-9763-EF19E19F9128}" type="datetime1">
               <a:rPr lang="en-US" smtClean="0"/>
-              <a:t>10/16/2019</a:t>
+              <a:t>10/21/2019</a:t>
             </a:fld>
             <a:endParaRPr lang="en-US"/>
           </a:p>
@@ -6355,7 +6355,7 @@
           <a:p>
             <a:fld id="{A2B5E9FB-9AD4-754B-A772-6D3733DD5BAC}" type="datetime1">
               <a:rPr lang="en-US" smtClean="0"/>
-              <a:t>10/16/2019</a:t>
+              <a:t>10/21/2019</a:t>
             </a:fld>
             <a:endParaRPr lang="en-US"/>
           </a:p>
@@ -6598,7 +6598,7 @@
           <a:p>
             <a:fld id="{3140DF9E-9222-EE48-A64D-28DE5FAE4784}" type="datetime1">
               <a:rPr lang="en-US" smtClean="0"/>
-              <a:t>10/16/2019</a:t>
+              <a:t>10/21/2019</a:t>
             </a:fld>
             <a:endParaRPr lang="en-US"/>
           </a:p>
@@ -6976,7 +6976,7 @@
           <a:p>
             <a:fld id="{A61490FA-57A5-0041-9FDC-ACD83A9AA0E7}" type="datetime1">
               <a:rPr lang="en-US" smtClean="0"/>
-              <a:t>10/16/2019</a:t>
+              <a:t>10/21/2019</a:t>
             </a:fld>
             <a:endParaRPr lang="en-US"/>
           </a:p>
@@ -7105,7 +7105,7 @@
           <a:p>
             <a:fld id="{7E8290BC-2F66-E549-BF33-0BE20A5801B5}" type="datetime1">
               <a:rPr lang="en-US" smtClean="0"/>
-              <a:t>10/16/2019</a:t>
+              <a:t>10/21/2019</a:t>
             </a:fld>
             <a:endParaRPr lang="en-US"/>
           </a:p>
@@ -7211,7 +7211,7 @@
           <a:p>
             <a:fld id="{3BC728CC-7587-8545-9431-C9A8BB34EC62}" type="datetime1">
               <a:rPr lang="en-US" smtClean="0"/>
-              <a:t>10/16/2019</a:t>
+              <a:t>10/21/2019</a:t>
             </a:fld>
             <a:endParaRPr lang="en-US"/>
           </a:p>
@@ -7499,7 +7499,7 @@
           <a:p>
             <a:fld id="{9A66CD15-5422-0542-9CE8-BC312846333A}" type="datetime1">
               <a:rPr lang="en-US" smtClean="0"/>
-              <a:t>10/16/2019</a:t>
+              <a:t>10/21/2019</a:t>
             </a:fld>
             <a:endParaRPr lang="en-US"/>
           </a:p>
@@ -7767,7 +7767,7 @@
           <a:p>
             <a:fld id="{2A2384D1-AE54-4D4A-B83F-6EAD03BEB987}" type="datetime1">
               <a:rPr lang="en-US" smtClean="0"/>
-              <a:t>10/16/2019</a:t>
+              <a:t>10/21/2019</a:t>
             </a:fld>
             <a:endParaRPr lang="en-US"/>
           </a:p>
@@ -13889,7 +13889,7 @@
         </p:blipFill>
         <p:spPr>
           <a:xfrm>
-            <a:off x="320283" y="1033207"/>
+            <a:off x="821335" y="2158622"/>
             <a:ext cx="7367365" cy="5174289"/>
           </a:xfrm>
           <a:prstGeom prst="rect">
@@ -13990,7 +13990,7 @@
         </p:blipFill>
         <p:spPr>
           <a:xfrm>
-            <a:off x="0" y="1824913"/>
+            <a:off x="193431" y="3390320"/>
             <a:ext cx="9144000" cy="2995706"/>
           </a:xfrm>
           <a:prstGeom prst="rect">

</xml_diff>